<commit_message>
Finalized first playable ppt
</commit_message>
<xml_diff>
--- a/First Playable.pptx
+++ b/First Playable.pptx
@@ -9,8 +9,8 @@
     <p:sldId id="269" r:id="rId3"/>
     <p:sldId id="260" r:id="rId4"/>
     <p:sldId id="273" r:id="rId5"/>
-    <p:sldId id="271" r:id="rId6"/>
-    <p:sldId id="272" r:id="rId7"/>
+    <p:sldId id="272" r:id="rId6"/>
+    <p:sldId id="271" r:id="rId7"/>
   </p:sldIdLst>
   <p:sldSz cx="12192000" cy="6858000"/>
   <p:notesSz cx="6858000" cy="9144000"/>
@@ -452,7 +452,7 @@
           <a:p>
             <a:fld id="{F9D143CE-0943-494A-8C87-33A860FC7B70}" type="datetimeFigureOut">
               <a:rPr lang="en-US" smtClean="0"/>
-              <a:t>10/7/2019</a:t>
+              <a:t>10/9/2019</a:t>
             </a:fld>
             <a:endParaRPr lang="en-US"/>
           </a:p>
@@ -1540,7 +1540,7 @@
           <a:p>
             <a:fld id="{F9D143CE-0943-494A-8C87-33A860FC7B70}" type="datetimeFigureOut">
               <a:rPr lang="en-US" smtClean="0"/>
-              <a:t>10/7/2019</a:t>
+              <a:t>10/9/2019</a:t>
             </a:fld>
             <a:endParaRPr lang="en-US"/>
           </a:p>
@@ -2520,7 +2520,7 @@
           <a:p>
             <a:fld id="{F9D143CE-0943-494A-8C87-33A860FC7B70}" type="datetimeFigureOut">
               <a:rPr lang="en-US" smtClean="0"/>
-              <a:t>10/7/2019</a:t>
+              <a:t>10/9/2019</a:t>
             </a:fld>
             <a:endParaRPr lang="en-US"/>
           </a:p>
@@ -3654,7 +3654,7 @@
           <a:p>
             <a:fld id="{F9D143CE-0943-494A-8C87-33A860FC7B70}" type="datetimeFigureOut">
               <a:rPr lang="en-US" smtClean="0"/>
-              <a:t>10/7/2019</a:t>
+              <a:t>10/9/2019</a:t>
             </a:fld>
             <a:endParaRPr lang="en-US"/>
           </a:p>
@@ -4687,7 +4687,7 @@
           <a:p>
             <a:fld id="{F9D143CE-0943-494A-8C87-33A860FC7B70}" type="datetimeFigureOut">
               <a:rPr lang="en-US" smtClean="0"/>
-              <a:t>10/7/2019</a:t>
+              <a:t>10/9/2019</a:t>
             </a:fld>
             <a:endParaRPr lang="en-US"/>
           </a:p>
@@ -5347,7 +5347,7 @@
           <a:p>
             <a:fld id="{F9D143CE-0943-494A-8C87-33A860FC7B70}" type="datetimeFigureOut">
               <a:rPr lang="en-US" smtClean="0"/>
-              <a:t>10/7/2019</a:t>
+              <a:t>10/9/2019</a:t>
             </a:fld>
             <a:endParaRPr lang="en-US"/>
           </a:p>
@@ -6208,7 +6208,7 @@
           <a:p>
             <a:fld id="{F9D143CE-0943-494A-8C87-33A860FC7B70}" type="datetimeFigureOut">
               <a:rPr lang="en-US" smtClean="0"/>
-              <a:t>10/7/2019</a:t>
+              <a:t>10/9/2019</a:t>
             </a:fld>
             <a:endParaRPr lang="en-US"/>
           </a:p>
@@ -6398,7 +6398,7 @@
           <a:p>
             <a:fld id="{F9D143CE-0943-494A-8C87-33A860FC7B70}" type="datetimeFigureOut">
               <a:rPr lang="en-US" smtClean="0"/>
-              <a:t>10/7/2019</a:t>
+              <a:t>10/9/2019</a:t>
             </a:fld>
             <a:endParaRPr lang="en-US"/>
           </a:p>
@@ -7370,7 +7370,7 @@
           <a:p>
             <a:fld id="{F9D143CE-0943-494A-8C87-33A860FC7B70}" type="datetimeFigureOut">
               <a:rPr lang="en-US" smtClean="0"/>
-              <a:t>10/7/2019</a:t>
+              <a:t>10/9/2019</a:t>
             </a:fld>
             <a:endParaRPr lang="en-US"/>
           </a:p>
@@ -7581,7 +7581,7 @@
           <a:p>
             <a:fld id="{F9D143CE-0943-494A-8C87-33A860FC7B70}" type="datetimeFigureOut">
               <a:rPr lang="en-US" smtClean="0"/>
-              <a:t>10/7/2019</a:t>
+              <a:t>10/9/2019</a:t>
             </a:fld>
             <a:endParaRPr lang="en-US"/>
           </a:p>
@@ -8615,7 +8615,7 @@
           <a:p>
             <a:fld id="{F9D143CE-0943-494A-8C87-33A860FC7B70}" type="datetimeFigureOut">
               <a:rPr lang="en-US" smtClean="0"/>
-              <a:t>10/7/2019</a:t>
+              <a:t>10/9/2019</a:t>
             </a:fld>
             <a:endParaRPr lang="en-US"/>
           </a:p>
@@ -8887,7 +8887,7 @@
           <a:p>
             <a:fld id="{F9D143CE-0943-494A-8C87-33A860FC7B70}" type="datetimeFigureOut">
               <a:rPr lang="en-US" smtClean="0"/>
-              <a:t>10/7/2019</a:t>
+              <a:t>10/9/2019</a:t>
             </a:fld>
             <a:endParaRPr lang="en-US"/>
           </a:p>
@@ -9297,7 +9297,7 @@
           <a:p>
             <a:fld id="{F9D143CE-0943-494A-8C87-33A860FC7B70}" type="datetimeFigureOut">
               <a:rPr lang="en-US" smtClean="0"/>
-              <a:t>10/7/2019</a:t>
+              <a:t>10/9/2019</a:t>
             </a:fld>
             <a:endParaRPr lang="en-US"/>
           </a:p>
@@ -9424,7 +9424,7 @@
           <a:p>
             <a:fld id="{F9D143CE-0943-494A-8C87-33A860FC7B70}" type="datetimeFigureOut">
               <a:rPr lang="en-US" smtClean="0"/>
-              <a:t>10/7/2019</a:t>
+              <a:t>10/9/2019</a:t>
             </a:fld>
             <a:endParaRPr lang="en-US"/>
           </a:p>
@@ -9519,7 +9519,7 @@
           <a:p>
             <a:fld id="{F9D143CE-0943-494A-8C87-33A860FC7B70}" type="datetimeFigureOut">
               <a:rPr lang="en-US" smtClean="0"/>
-              <a:t>10/7/2019</a:t>
+              <a:t>10/9/2019</a:t>
             </a:fld>
             <a:endParaRPr lang="en-US"/>
           </a:p>
@@ -10600,7 +10600,7 @@
           <a:p>
             <a:fld id="{F9D143CE-0943-494A-8C87-33A860FC7B70}" type="datetimeFigureOut">
               <a:rPr lang="en-US" smtClean="0"/>
-              <a:t>10/7/2019</a:t>
+              <a:t>10/9/2019</a:t>
             </a:fld>
             <a:endParaRPr lang="en-US"/>
           </a:p>
@@ -11708,7 +11708,7 @@
           <a:p>
             <a:fld id="{F9D143CE-0943-494A-8C87-33A860FC7B70}" type="datetimeFigureOut">
               <a:rPr lang="en-US" smtClean="0"/>
-              <a:t>10/7/2019</a:t>
+              <a:t>10/9/2019</a:t>
             </a:fld>
             <a:endParaRPr lang="en-US"/>
           </a:p>
@@ -12705,7 +12705,7 @@
           <a:p>
             <a:fld id="{F9D143CE-0943-494A-8C87-33A860FC7B70}" type="datetimeFigureOut">
               <a:rPr lang="en-US" smtClean="0"/>
-              <a:t>10/7/2019</a:t>
+              <a:t>10/9/2019</a:t>
             </a:fld>
             <a:endParaRPr lang="en-US"/>
           </a:p>
@@ -14033,18 +14033,18 @@
         </p:nvSpPr>
         <p:spPr>
           <a:xfrm>
-            <a:off x="1154952" y="2536825"/>
-            <a:ext cx="4302871" cy="3416300"/>
+            <a:off x="1141634" y="2698749"/>
+            <a:ext cx="4302871" cy="3949700"/>
           </a:xfrm>
         </p:spPr>
         <p:txBody>
           <a:bodyPr>
-            <a:normAutofit fontScale="92500" lnSpcReduction="20000"/>
+            <a:noAutofit/>
           </a:bodyPr>
           <a:lstStyle/>
           <a:p>
             <a:r>
-              <a:rPr lang="en-US" dirty="0"/>
+              <a:rPr lang="en-US" sz="1600" dirty="0"/>
               <a:t>Map generation</a:t>
             </a:r>
           </a:p>
@@ -14064,7 +14064,7 @@
           </a:p>
           <a:p>
             <a:r>
-              <a:rPr lang="en-US" dirty="0"/>
+              <a:rPr lang="en-US" sz="1600" dirty="0"/>
               <a:t>Core Weapons Implemented</a:t>
             </a:r>
           </a:p>
@@ -14077,13 +14077,13 @@
           </a:p>
           <a:p>
             <a:r>
-              <a:rPr lang="en-US" dirty="0"/>
+              <a:rPr lang="en-US" sz="1600" dirty="0"/>
               <a:t>AI can move and shoot</a:t>
             </a:r>
           </a:p>
           <a:p>
             <a:r>
-              <a:rPr lang="en-US" dirty="0"/>
+              <a:rPr lang="en-US" sz="1600" dirty="0"/>
               <a:t>Working Game State </a:t>
             </a:r>
           </a:p>
@@ -14096,13 +14096,13 @@
           </a:p>
           <a:p>
             <a:r>
-              <a:rPr lang="en-US" dirty="0"/>
+              <a:rPr lang="en-US" sz="1600" dirty="0"/>
               <a:t>Rudimentary Weapon Swap</a:t>
             </a:r>
           </a:p>
           <a:p>
             <a:r>
-              <a:rPr lang="en-US" dirty="0"/>
+              <a:rPr lang="en-US" sz="1600" dirty="0"/>
               <a:t>Destructible Terrain</a:t>
             </a:r>
           </a:p>
@@ -14367,45 +14367,6 @@
           </a:p>
         </p:txBody>
       </p:sp>
-      <p:pic>
-        <p:nvPicPr>
-          <p:cNvPr id="9" name="Graphic 8" descr="Checkmark">
-            <a:extLst>
-              <a:ext uri="{FF2B5EF4-FFF2-40B4-BE49-F238E27FC236}">
-                <a16:creationId xmlns:a16="http://schemas.microsoft.com/office/drawing/2014/main" id="{CAFE6587-DADA-4A26-949D-4945491BAFBB}"/>
-              </a:ext>
-            </a:extLst>
-          </p:cNvPr>
-          <p:cNvPicPr>
-            <a:picLocks noChangeAspect="1"/>
-          </p:cNvPicPr>
-          <p:nvPr/>
-        </p:nvPicPr>
-        <p:blipFill>
-          <a:blip r:embed="rId2">
-            <a:extLst>
-              <a:ext uri="{28A0092B-C50C-407E-A947-70E740481C1C}">
-                <a14:useLocalDpi xmlns:a14="http://schemas.microsoft.com/office/drawing/2010/main" val="0"/>
-              </a:ext>
-              <a:ext uri="{96DAC541-7B7A-43D3-8B79-37D633B846F1}">
-                <asvg:svgBlip xmlns:asvg="http://schemas.microsoft.com/office/drawing/2016/SVG/main" r:embed="rId3"/>
-              </a:ext>
-            </a:extLst>
-          </a:blip>
-          <a:stretch>
-            <a:fillRect/>
-          </a:stretch>
-        </p:blipFill>
-        <p:spPr>
-          <a:xfrm>
-            <a:off x="11329874" y="1994430"/>
-            <a:ext cx="510645" cy="510645"/>
-          </a:xfrm>
-          <a:prstGeom prst="rect">
-            <a:avLst/>
-          </a:prstGeom>
-        </p:spPr>
-      </p:pic>
       <p:sp>
         <p:nvSpPr>
           <p:cNvPr id="12" name="Content Placeholder 2">
@@ -14422,8 +14383,8 @@
         </p:nvSpPr>
         <p:spPr>
           <a:xfrm>
-            <a:off x="6734177" y="2393950"/>
-            <a:ext cx="4302871" cy="3416300"/>
+            <a:off x="6734177" y="2698750"/>
+            <a:ext cx="4302871" cy="3949700"/>
           </a:xfrm>
           <a:prstGeom prst="rect">
             <a:avLst/>
@@ -14431,7 +14392,7 @@
         </p:spPr>
         <p:txBody>
           <a:bodyPr vert="horz" lIns="91440" tIns="45720" rIns="91440" bIns="45720" rtlCol="0">
-            <a:normAutofit fontScale="85000" lnSpcReduction="20000"/>
+            <a:noAutofit/>
           </a:bodyPr>
           <a:lstStyle>
             <a:lvl1pPr marL="342900" indent="-342900" algn="l" defTabSz="457200" rtl="0" eaLnBrk="1" latinLnBrk="0" hangingPunct="1">
@@ -14662,7 +14623,7 @@
           </a:lstStyle>
           <a:p>
             <a:r>
-              <a:rPr lang="en-US" dirty="0"/>
+              <a:rPr lang="en-US" sz="1600" dirty="0"/>
               <a:t>Map generation</a:t>
             </a:r>
           </a:p>
@@ -14674,15 +14635,8 @@
             </a:r>
           </a:p>
           <a:p>
-            <a:pPr lvl="1"/>
             <a:r>
-              <a:rPr lang="en-US" dirty="0"/>
-              <a:t>No environment hazards</a:t>
-            </a:r>
-          </a:p>
-          <a:p>
-            <a:r>
-              <a:rPr lang="en-US" dirty="0"/>
+              <a:rPr lang="en-US" sz="1600" dirty="0"/>
               <a:t>Core Weapons Implemented</a:t>
             </a:r>
           </a:p>
@@ -14695,13 +14649,13 @@
           </a:p>
           <a:p>
             <a:r>
-              <a:rPr lang="en-US" dirty="0"/>
-              <a:t>AI can move and shoot</a:t>
+              <a:rPr lang="en-US" sz="1600" dirty="0"/>
+              <a:t>AI targeting</a:t>
             </a:r>
           </a:p>
           <a:p>
             <a:r>
-              <a:rPr lang="en-US" dirty="0"/>
+              <a:rPr lang="en-US" sz="1600" dirty="0"/>
               <a:t>Working Game State </a:t>
             </a:r>
           </a:p>
@@ -14714,20 +14668,96 @@
           </a:p>
           <a:p>
             <a:r>
-              <a:rPr lang="en-US" dirty="0"/>
+              <a:rPr lang="en-US" sz="1600" dirty="0"/>
               <a:t>Rudimentary Weapon Swap</a:t>
             </a:r>
           </a:p>
           <a:p>
             <a:r>
-              <a:rPr lang="en-US" dirty="0"/>
+              <a:rPr lang="en-US" sz="1600" dirty="0"/>
               <a:t>Destructible Terrain</a:t>
             </a:r>
           </a:p>
           <a:p>
             <a:r>
-              <a:rPr lang="en-US" dirty="0"/>
+              <a:rPr lang="en-US" sz="1600" dirty="0"/>
               <a:t>Pre-Game menu</a:t>
+            </a:r>
+          </a:p>
+          <a:p>
+            <a:r>
+              <a:rPr lang="en-US" sz="1600" dirty="0"/>
+              <a:t>Game clocks</a:t>
+            </a:r>
+          </a:p>
+        </p:txBody>
+      </p:sp>
+      <p:sp>
+        <p:nvSpPr>
+          <p:cNvPr id="5" name="TextBox 4">
+            <a:extLst>
+              <a:ext uri="{FF2B5EF4-FFF2-40B4-BE49-F238E27FC236}">
+                <a16:creationId xmlns:a16="http://schemas.microsoft.com/office/drawing/2014/main" id="{AE437234-3998-4622-B602-DFE8DE49EF1E}"/>
+              </a:ext>
+            </a:extLst>
+          </p:cNvPr>
+          <p:cNvSpPr txBox="1"/>
+          <p:nvPr/>
+        </p:nvSpPr>
+        <p:spPr>
+          <a:xfrm>
+            <a:off x="1154954" y="2234168"/>
+            <a:ext cx="4017123" cy="369332"/>
+          </a:xfrm>
+          <a:prstGeom prst="rect">
+            <a:avLst/>
+          </a:prstGeom>
+          <a:noFill/>
+        </p:spPr>
+        <p:txBody>
+          <a:bodyPr wrap="square" rtlCol="0">
+            <a:spAutoFit/>
+          </a:bodyPr>
+          <a:lstStyle/>
+          <a:p>
+            <a:r>
+              <a:rPr lang="en-US" b="1" dirty="0"/>
+              <a:t>Commitment</a:t>
+            </a:r>
+          </a:p>
+        </p:txBody>
+      </p:sp>
+      <p:sp>
+        <p:nvSpPr>
+          <p:cNvPr id="8" name="TextBox 7">
+            <a:extLst>
+              <a:ext uri="{FF2B5EF4-FFF2-40B4-BE49-F238E27FC236}">
+                <a16:creationId xmlns:a16="http://schemas.microsoft.com/office/drawing/2014/main" id="{D6E66CA6-26FF-49A7-AC0E-2601D320DCD1}"/>
+              </a:ext>
+            </a:extLst>
+          </p:cNvPr>
+          <p:cNvSpPr txBox="1"/>
+          <p:nvPr/>
+        </p:nvSpPr>
+        <p:spPr>
+          <a:xfrm>
+            <a:off x="6734177" y="2248428"/>
+            <a:ext cx="4017123" cy="369332"/>
+          </a:xfrm>
+          <a:prstGeom prst="rect">
+            <a:avLst/>
+          </a:prstGeom>
+          <a:noFill/>
+        </p:spPr>
+        <p:txBody>
+          <a:bodyPr wrap="square" rtlCol="0">
+            <a:spAutoFit/>
+          </a:bodyPr>
+          <a:lstStyle/>
+          <a:p>
+            <a:r>
+              <a:rPr lang="en-US" b="1" dirty="0"/>
+              <a:t>Progress</a:t>
             </a:r>
           </a:p>
         </p:txBody>
@@ -14826,16 +14856,15 @@
           <a:p>
             <a:pPr lvl="1"/>
             <a:r>
-              <a:rPr lang="en-US" sz="2000"/>
+              <a:rPr lang="en-US" sz="2000" dirty="0"/>
               <a:t>Pre Game Menu</a:t>
             </a:r>
-            <a:endParaRPr lang="en-US" sz="2000" dirty="0"/>
           </a:p>
           <a:p>
             <a:pPr lvl="1"/>
             <a:r>
               <a:rPr lang="en-US" sz="2000" dirty="0"/>
-              <a:t>AI movement</a:t>
+              <a:t>Game clocks</a:t>
             </a:r>
           </a:p>
           <a:p>
@@ -14843,6 +14872,13 @@
             <a:r>
               <a:rPr lang="en-US" sz="2000" dirty="0"/>
               <a:t>Weapon Implementation</a:t>
+            </a:r>
+          </a:p>
+          <a:p>
+            <a:pPr lvl="1"/>
+            <a:r>
+              <a:rPr lang="en-US" sz="2000" dirty="0"/>
+              <a:t>Menu art</a:t>
             </a:r>
           </a:p>
         </p:txBody>
@@ -15271,14 +15307,7 @@
             <a:pPr lvl="1"/>
             <a:r>
               <a:rPr lang="en-US" sz="2000" dirty="0"/>
-              <a:t>Projectile Pathing</a:t>
-            </a:r>
-          </a:p>
-          <a:p>
-            <a:pPr lvl="1"/>
-            <a:r>
-              <a:rPr lang="en-US" sz="2000" dirty="0"/>
-              <a:t>Collisions</a:t>
+              <a:t>Camera Controls</a:t>
             </a:r>
           </a:p>
           <a:p>
@@ -15293,6 +15322,13 @@
             <a:r>
               <a:rPr lang="en-US" sz="2000" dirty="0"/>
               <a:t>Weapon Implementation</a:t>
+            </a:r>
+          </a:p>
+          <a:p>
+            <a:pPr lvl="1"/>
+            <a:r>
+              <a:rPr lang="en-US" sz="2000" dirty="0"/>
+              <a:t>Player animations</a:t>
             </a:r>
           </a:p>
         </p:txBody>
@@ -15561,14 +15597,14 @@
             <a:pPr lvl="1"/>
             <a:r>
               <a:rPr lang="en-US" sz="2000" dirty="0"/>
-              <a:t>Map Generation</a:t>
+              <a:t>WordPress updates</a:t>
             </a:r>
           </a:p>
           <a:p>
             <a:pPr lvl="1"/>
             <a:r>
               <a:rPr lang="en-US" sz="2000" dirty="0"/>
-              <a:t>WordPress</a:t>
+              <a:t>Map Generation</a:t>
             </a:r>
           </a:p>
           <a:p>
@@ -15582,7 +15618,14 @@
             <a:pPr lvl="1"/>
             <a:r>
               <a:rPr lang="en-US" sz="2000" dirty="0"/>
-              <a:t>Weapon Implementation</a:t>
+              <a:t>Audio Management</a:t>
+            </a:r>
+          </a:p>
+          <a:p>
+            <a:pPr lvl="1"/>
+            <a:r>
+              <a:rPr lang="en-US" sz="2000" dirty="0"/>
+              <a:t>Environment art</a:t>
             </a:r>
           </a:p>
         </p:txBody>
@@ -15792,23 +15835,19 @@
           <a:p>
             <a:r>
               <a:rPr lang="en-US" dirty="0"/>
-              <a:t>Version control and merge conflicts with Unity</a:t>
+              <a:t>Git Version control and merge conflicts with Unity settings</a:t>
             </a:r>
           </a:p>
           <a:p>
-            <a:r>
-              <a:rPr lang="en-US"/>
-              <a:t>Implementing </a:t>
-            </a:r>
             <a:r>
               <a:rPr lang="en-US" dirty="0"/>
-              <a:t>a proficient AI</a:t>
+              <a:t>Finding free art that matched art style</a:t>
             </a:r>
           </a:p>
           <a:p>
             <a:r>
               <a:rPr lang="en-US" dirty="0"/>
-              <a:t>Generating a map that makes sense</a:t>
+              <a:t>Generating a playable map</a:t>
             </a:r>
           </a:p>
           <a:p>
@@ -15816,6 +15855,12 @@
               <a:rPr lang="en-US" dirty="0"/>
               <a:t>Physics and animations integration</a:t>
             </a:r>
+          </a:p>
+          <a:p>
+            <a:pPr marL="0" indent="0">
+              <a:buNone/>
+            </a:pPr>
+            <a:endParaRPr lang="en-US" dirty="0"/>
           </a:p>
         </p:txBody>
       </p:sp>
@@ -15854,6 +15899,89 @@
           <p:cNvPr id="2" name="Title 1">
             <a:extLst>
               <a:ext uri="{FF2B5EF4-FFF2-40B4-BE49-F238E27FC236}">
+                <a16:creationId xmlns:a16="http://schemas.microsoft.com/office/drawing/2014/main" id="{AF27E8D1-4078-4498-8C7E-C93095F1ABCF}"/>
+              </a:ext>
+            </a:extLst>
+          </p:cNvPr>
+          <p:cNvSpPr>
+            <a:spLocks noGrp="1"/>
+          </p:cNvSpPr>
+          <p:nvPr>
+            <p:ph type="title"/>
+          </p:nvPr>
+        </p:nvSpPr>
+        <p:spPr/>
+        <p:txBody>
+          <a:bodyPr/>
+          <a:lstStyle/>
+          <a:p>
+            <a:r>
+              <a:rPr lang="en-US" dirty="0"/>
+              <a:t>Demo</a:t>
+            </a:r>
+          </a:p>
+        </p:txBody>
+      </p:sp>
+      <p:sp>
+        <p:nvSpPr>
+          <p:cNvPr id="3" name="Content Placeholder 2">
+            <a:extLst>
+              <a:ext uri="{FF2B5EF4-FFF2-40B4-BE49-F238E27FC236}">
+                <a16:creationId xmlns:a16="http://schemas.microsoft.com/office/drawing/2014/main" id="{6AE796FF-3314-4FCE-9FE9-5DB1FE976FDA}"/>
+              </a:ext>
+            </a:extLst>
+          </p:cNvPr>
+          <p:cNvSpPr>
+            <a:spLocks noGrp="1"/>
+          </p:cNvSpPr>
+          <p:nvPr>
+            <p:ph idx="1"/>
+          </p:nvPr>
+        </p:nvSpPr>
+        <p:spPr/>
+        <p:txBody>
+          <a:bodyPr/>
+          <a:lstStyle/>
+          <a:p>
+            <a:endParaRPr lang="en-US"/>
+          </a:p>
+        </p:txBody>
+      </p:sp>
+    </p:spTree>
+    <p:extLst>
+      <p:ext uri="{BB962C8B-B14F-4D97-AF65-F5344CB8AC3E}">
+        <p14:creationId xmlns:p14="http://schemas.microsoft.com/office/powerpoint/2010/main" val="1772034571"/>
+      </p:ext>
+    </p:extLst>
+  </p:cSld>
+  <p:clrMapOvr>
+    <a:masterClrMapping/>
+  </p:clrMapOvr>
+</p:sld>
+</file>
+
+<file path=ppt/slides/slide6.xml><?xml version="1.0" encoding="utf-8"?>
+<p:sld xmlns:a="http://schemas.openxmlformats.org/drawingml/2006/main" xmlns:r="http://schemas.openxmlformats.org/officeDocument/2006/relationships" xmlns:p="http://schemas.openxmlformats.org/presentationml/2006/main">
+  <p:cSld>
+    <p:spTree>
+      <p:nvGrpSpPr>
+        <p:cNvPr id="1" name=""/>
+        <p:cNvGrpSpPr/>
+        <p:nvPr/>
+      </p:nvGrpSpPr>
+      <p:grpSpPr>
+        <a:xfrm>
+          <a:off x="0" y="0"/>
+          <a:ext cx="0" cy="0"/>
+          <a:chOff x="0" y="0"/>
+          <a:chExt cx="0" cy="0"/>
+        </a:xfrm>
+      </p:grpSpPr>
+      <p:sp>
+        <p:nvSpPr>
+          <p:cNvPr id="2" name="Title 1">
+            <a:extLst>
+              <a:ext uri="{FF2B5EF4-FFF2-40B4-BE49-F238E27FC236}">
                 <a16:creationId xmlns:a16="http://schemas.microsoft.com/office/drawing/2014/main" id="{6CCCB0C3-17A3-416D-BC5C-52A64C5055E3}"/>
               </a:ext>
             </a:extLst>
@@ -15872,7 +16000,7 @@
           <a:p>
             <a:r>
               <a:rPr lang="en-US" dirty="0"/>
-              <a:t>Goals for Testing Day 11/18</a:t>
+              <a:t>Commitments for Testing Day 11/18</a:t>
             </a:r>
           </a:p>
         </p:txBody>
@@ -15901,13 +16029,13 @@
         </p:spPr>
         <p:txBody>
           <a:bodyPr>
-            <a:normAutofit fontScale="92500" lnSpcReduction="20000"/>
+            <a:normAutofit fontScale="92500" lnSpcReduction="10000"/>
           </a:bodyPr>
           <a:lstStyle/>
           <a:p>
             <a:r>
               <a:rPr lang="en-US" dirty="0"/>
-              <a:t>Environmental Hazards</a:t>
+              <a:t>3 Map themes</a:t>
             </a:r>
           </a:p>
           <a:p>
@@ -15919,7 +16047,19 @@
           <a:p>
             <a:r>
               <a:rPr lang="en-US" dirty="0"/>
-              <a:t>More weapons of each type implemented</a:t>
+              <a:t>Weapon inventory per team</a:t>
+            </a:r>
+          </a:p>
+          <a:p>
+            <a:r>
+              <a:rPr lang="en-US" dirty="0"/>
+              <a:t>Environment graphics polishing</a:t>
+            </a:r>
+          </a:p>
+          <a:p>
+            <a:r>
+              <a:rPr lang="en-US" dirty="0"/>
+              <a:t>More weapons</a:t>
             </a:r>
           </a:p>
           <a:p>
@@ -15947,12 +16087,6 @@
             <a:r>
               <a:rPr lang="en-US" dirty="0"/>
               <a:t>Player death</a:t>
-            </a:r>
-          </a:p>
-          <a:p>
-            <a:r>
-              <a:rPr lang="en-US" dirty="0"/>
-              <a:t>Improved AI Player shooting and movement</a:t>
             </a:r>
           </a:p>
         </p:txBody>
@@ -16234,29 +16368,35 @@
             <a:pPr lvl="1"/>
             <a:r>
               <a:rPr lang="en-US" dirty="0"/>
-              <a:t>Game Clock</a:t>
+              <a:t>Player Name and health bar</a:t>
             </a:r>
           </a:p>
           <a:p>
-            <a:pPr lvl="1"/>
             <a:r>
               <a:rPr lang="en-US" dirty="0"/>
-              <a:t>Turn Clock</a:t>
+              <a:t>Options Menu</a:t>
             </a:r>
           </a:p>
           <a:p>
-            <a:pPr lvl="1"/>
             <a:r>
               <a:rPr lang="en-US" dirty="0"/>
-              <a:t>Turn</a:t>
+              <a:t>Supply drops</a:t>
             </a:r>
           </a:p>
           <a:p>
-            <a:pPr lvl="1"/>
             <a:r>
               <a:rPr lang="en-US" dirty="0"/>
-              <a:t>Player Name and health bar</a:t>
+              <a:t>Improved AI Player shooting and movement</a:t>
             </a:r>
+          </a:p>
+          <a:p>
+            <a:r>
+              <a:rPr lang="en-US" dirty="0"/>
+              <a:t>Scalable UI</a:t>
+            </a:r>
+          </a:p>
+          <a:p>
+            <a:endParaRPr lang="en-US" dirty="0"/>
           </a:p>
         </p:txBody>
       </p:sp>
@@ -16264,89 +16404,6 @@
     <p:extLst>
       <p:ext uri="{BB962C8B-B14F-4D97-AF65-F5344CB8AC3E}">
         <p14:creationId xmlns:p14="http://schemas.microsoft.com/office/powerpoint/2010/main" val="4235614837"/>
-      </p:ext>
-    </p:extLst>
-  </p:cSld>
-  <p:clrMapOvr>
-    <a:masterClrMapping/>
-  </p:clrMapOvr>
-</p:sld>
-</file>
-
-<file path=ppt/slides/slide6.xml><?xml version="1.0" encoding="utf-8"?>
-<p:sld xmlns:a="http://schemas.openxmlformats.org/drawingml/2006/main" xmlns:r="http://schemas.openxmlformats.org/officeDocument/2006/relationships" xmlns:p="http://schemas.openxmlformats.org/presentationml/2006/main">
-  <p:cSld>
-    <p:spTree>
-      <p:nvGrpSpPr>
-        <p:cNvPr id="1" name=""/>
-        <p:cNvGrpSpPr/>
-        <p:nvPr/>
-      </p:nvGrpSpPr>
-      <p:grpSpPr>
-        <a:xfrm>
-          <a:off x="0" y="0"/>
-          <a:ext cx="0" cy="0"/>
-          <a:chOff x="0" y="0"/>
-          <a:chExt cx="0" cy="0"/>
-        </a:xfrm>
-      </p:grpSpPr>
-      <p:sp>
-        <p:nvSpPr>
-          <p:cNvPr id="2" name="Title 1">
-            <a:extLst>
-              <a:ext uri="{FF2B5EF4-FFF2-40B4-BE49-F238E27FC236}">
-                <a16:creationId xmlns:a16="http://schemas.microsoft.com/office/drawing/2014/main" id="{AF27E8D1-4078-4498-8C7E-C93095F1ABCF}"/>
-              </a:ext>
-            </a:extLst>
-          </p:cNvPr>
-          <p:cNvSpPr>
-            <a:spLocks noGrp="1"/>
-          </p:cNvSpPr>
-          <p:nvPr>
-            <p:ph type="title"/>
-          </p:nvPr>
-        </p:nvSpPr>
-        <p:spPr/>
-        <p:txBody>
-          <a:bodyPr/>
-          <a:lstStyle/>
-          <a:p>
-            <a:r>
-              <a:rPr lang="en-US" dirty="0"/>
-              <a:t>Demo</a:t>
-            </a:r>
-          </a:p>
-        </p:txBody>
-      </p:sp>
-      <p:sp>
-        <p:nvSpPr>
-          <p:cNvPr id="3" name="Content Placeholder 2">
-            <a:extLst>
-              <a:ext uri="{FF2B5EF4-FFF2-40B4-BE49-F238E27FC236}">
-                <a16:creationId xmlns:a16="http://schemas.microsoft.com/office/drawing/2014/main" id="{6AE796FF-3314-4FCE-9FE9-5DB1FE976FDA}"/>
-              </a:ext>
-            </a:extLst>
-          </p:cNvPr>
-          <p:cNvSpPr>
-            <a:spLocks noGrp="1"/>
-          </p:cNvSpPr>
-          <p:nvPr>
-            <p:ph idx="1"/>
-          </p:nvPr>
-        </p:nvSpPr>
-        <p:spPr/>
-        <p:txBody>
-          <a:bodyPr/>
-          <a:lstStyle/>
-          <a:p>
-            <a:endParaRPr lang="en-US"/>
-          </a:p>
-        </p:txBody>
-      </p:sp>
-    </p:spTree>
-    <p:extLst>
-      <p:ext uri="{BB962C8B-B14F-4D97-AF65-F5344CB8AC3E}">
-        <p14:creationId xmlns:p14="http://schemas.microsoft.com/office/powerpoint/2010/main" val="1772034571"/>
       </p:ext>
     </p:extLst>
   </p:cSld>

</xml_diff>